<commit_message>
Send Email & Service injection
</commit_message>
<xml_diff>
--- a/Housing.pptx
+++ b/Housing.pptx
@@ -17,6 +17,11 @@
     <p:sldId id="266" r:id="rId11"/>
     <p:sldId id="267" r:id="rId12"/>
     <p:sldId id="268" r:id="rId13"/>
+    <p:sldId id="274" r:id="rId14"/>
+    <p:sldId id="272" r:id="rId15"/>
+    <p:sldId id="269" r:id="rId16"/>
+    <p:sldId id="273" r:id="rId17"/>
+    <p:sldId id="271" r:id="rId18"/>
   </p:sldIdLst>
   <p:sldSz cx="12192000" cy="6858000"/>
   <p:notesSz cx="6858000" cy="9144000"/>
@@ -116,6 +121,35 @@
     </a:lvl9pPr>
   </p:defaultTextStyle>
   <p:extLst>
+    <p:ext uri="{521415D9-36F7-43E2-AB2F-B90AF26B5E84}">
+      <p14:sectionLst xmlns:p14="http://schemas.microsoft.com/office/powerpoint/2010/main">
+        <p14:section name="Default Section" id="{DC1279AF-0E92-47D8-96CB-BAD70DB391E6}">
+          <p14:sldIdLst>
+            <p14:sldId id="256"/>
+            <p14:sldId id="259"/>
+            <p14:sldId id="263"/>
+            <p14:sldId id="261"/>
+            <p14:sldId id="258"/>
+            <p14:sldId id="260"/>
+            <p14:sldId id="262"/>
+            <p14:sldId id="264"/>
+            <p14:sldId id="265"/>
+            <p14:sldId id="266"/>
+            <p14:sldId id="267"/>
+            <p14:sldId id="268"/>
+            <p14:sldId id="274"/>
+            <p14:sldId id="272"/>
+          </p14:sldIdLst>
+        </p14:section>
+        <p14:section name="TBD" id="{BDA90ABB-E26E-4479-864C-B3B2A7D967DE}">
+          <p14:sldIdLst>
+            <p14:sldId id="269"/>
+            <p14:sldId id="273"/>
+            <p14:sldId id="271"/>
+          </p14:sldIdLst>
+        </p14:section>
+      </p14:sectionLst>
+    </p:ext>
     <p:ext uri="{EFAFB233-063F-42B5-8137-9DF3F51BA10A}">
       <p15:sldGuideLst xmlns:p15="http://schemas.microsoft.com/office/powerpoint/2012/main"/>
     </p:ext>
@@ -9455,7 +9489,7 @@
           <a:p>
             <a:fld id="{405382DF-895D-41CF-B178-91ECF3162CFA}" type="datetimeFigureOut">
               <a:rPr lang="en-US" smtClean="0"/>
-              <a:t>2/26/2024</a:t>
+              <a:t>2/29/2024</a:t>
             </a:fld>
             <a:endParaRPr lang="en-US"/>
           </a:p>
@@ -9653,7 +9687,7 @@
           <a:p>
             <a:fld id="{405382DF-895D-41CF-B178-91ECF3162CFA}" type="datetimeFigureOut">
               <a:rPr lang="en-US" smtClean="0"/>
-              <a:t>2/26/2024</a:t>
+              <a:t>2/29/2024</a:t>
             </a:fld>
             <a:endParaRPr lang="en-US"/>
           </a:p>
@@ -9861,7 +9895,7 @@
           <a:p>
             <a:fld id="{405382DF-895D-41CF-B178-91ECF3162CFA}" type="datetimeFigureOut">
               <a:rPr lang="en-US" smtClean="0"/>
-              <a:t>2/26/2024</a:t>
+              <a:t>2/29/2024</a:t>
             </a:fld>
             <a:endParaRPr lang="en-US"/>
           </a:p>
@@ -10059,7 +10093,7 @@
           <a:p>
             <a:fld id="{405382DF-895D-41CF-B178-91ECF3162CFA}" type="datetimeFigureOut">
               <a:rPr lang="en-US" smtClean="0"/>
-              <a:t>2/26/2024</a:t>
+              <a:t>2/29/2024</a:t>
             </a:fld>
             <a:endParaRPr lang="en-US"/>
           </a:p>
@@ -10334,7 +10368,7 @@
           <a:p>
             <a:fld id="{405382DF-895D-41CF-B178-91ECF3162CFA}" type="datetimeFigureOut">
               <a:rPr lang="en-US" smtClean="0"/>
-              <a:t>2/26/2024</a:t>
+              <a:t>2/29/2024</a:t>
             </a:fld>
             <a:endParaRPr lang="en-US"/>
           </a:p>
@@ -10599,7 +10633,7 @@
           <a:p>
             <a:fld id="{405382DF-895D-41CF-B178-91ECF3162CFA}" type="datetimeFigureOut">
               <a:rPr lang="en-US" smtClean="0"/>
-              <a:t>2/26/2024</a:t>
+              <a:t>2/29/2024</a:t>
             </a:fld>
             <a:endParaRPr lang="en-US"/>
           </a:p>
@@ -11011,7 +11045,7 @@
           <a:p>
             <a:fld id="{405382DF-895D-41CF-B178-91ECF3162CFA}" type="datetimeFigureOut">
               <a:rPr lang="en-US" smtClean="0"/>
-              <a:t>2/26/2024</a:t>
+              <a:t>2/29/2024</a:t>
             </a:fld>
             <a:endParaRPr lang="en-US"/>
           </a:p>
@@ -11152,7 +11186,7 @@
           <a:p>
             <a:fld id="{405382DF-895D-41CF-B178-91ECF3162CFA}" type="datetimeFigureOut">
               <a:rPr lang="en-US" smtClean="0"/>
-              <a:t>2/26/2024</a:t>
+              <a:t>2/29/2024</a:t>
             </a:fld>
             <a:endParaRPr lang="en-US"/>
           </a:p>
@@ -11265,7 +11299,7 @@
           <a:p>
             <a:fld id="{405382DF-895D-41CF-B178-91ECF3162CFA}" type="datetimeFigureOut">
               <a:rPr lang="en-US" smtClean="0"/>
-              <a:t>2/26/2024</a:t>
+              <a:t>2/29/2024</a:t>
             </a:fld>
             <a:endParaRPr lang="en-US"/>
           </a:p>
@@ -11576,7 +11610,7 @@
           <a:p>
             <a:fld id="{405382DF-895D-41CF-B178-91ECF3162CFA}" type="datetimeFigureOut">
               <a:rPr lang="en-US" smtClean="0"/>
-              <a:t>2/26/2024</a:t>
+              <a:t>2/29/2024</a:t>
             </a:fld>
             <a:endParaRPr lang="en-US"/>
           </a:p>
@@ -11864,7 +11898,7 @@
           <a:p>
             <a:fld id="{405382DF-895D-41CF-B178-91ECF3162CFA}" type="datetimeFigureOut">
               <a:rPr lang="en-US" smtClean="0"/>
-              <a:t>2/26/2024</a:t>
+              <a:t>2/29/2024</a:t>
             </a:fld>
             <a:endParaRPr lang="en-US"/>
           </a:p>
@@ -12105,7 +12139,7 @@
           <a:p>
             <a:fld id="{405382DF-895D-41CF-B178-91ECF3162CFA}" type="datetimeFigureOut">
               <a:rPr lang="en-US" smtClean="0"/>
-              <a:t>2/26/2024</a:t>
+              <a:t>2/29/2024</a:t>
             </a:fld>
             <a:endParaRPr lang="en-US"/>
           </a:p>
@@ -16196,6 +16230,709 @@
 </p:sld>
 </file>
 
+<file path=ppt/slides/slide13.xml><?xml version="1.0" encoding="utf-8"?>
+<p:sld xmlns:a="http://schemas.openxmlformats.org/drawingml/2006/main" xmlns:r="http://schemas.openxmlformats.org/officeDocument/2006/relationships" xmlns:p="http://schemas.openxmlformats.org/presentationml/2006/main">
+  <p:cSld>
+    <p:spTree>
+      <p:nvGrpSpPr>
+        <p:cNvPr id="1" name=""/>
+        <p:cNvGrpSpPr/>
+        <p:nvPr/>
+      </p:nvGrpSpPr>
+      <p:grpSpPr>
+        <a:xfrm>
+          <a:off x="0" y="0"/>
+          <a:ext cx="0" cy="0"/>
+          <a:chOff x="0" y="0"/>
+          <a:chExt cx="0" cy="0"/>
+        </a:xfrm>
+      </p:grpSpPr>
+      <p:sp>
+        <p:nvSpPr>
+          <p:cNvPr id="2" name="Title 1">
+            <a:extLst>
+              <a:ext uri="{FF2B5EF4-FFF2-40B4-BE49-F238E27FC236}">
+                <a16:creationId xmlns:a16="http://schemas.microsoft.com/office/drawing/2014/main" id="{0D2C5D5E-E933-0C70-F532-B5A8932F28DB}"/>
+              </a:ext>
+            </a:extLst>
+          </p:cNvPr>
+          <p:cNvSpPr>
+            <a:spLocks noGrp="1"/>
+          </p:cNvSpPr>
+          <p:nvPr>
+            <p:ph type="title"/>
+          </p:nvPr>
+        </p:nvSpPr>
+        <p:spPr/>
+        <p:txBody>
+          <a:bodyPr/>
+          <a:lstStyle/>
+          <a:p>
+            <a:r>
+              <a:rPr lang="en-US" dirty="0"/>
+              <a:t>07- Send Email &amp; Service</a:t>
+            </a:r>
+          </a:p>
+        </p:txBody>
+      </p:sp>
+      <p:sp>
+        <p:nvSpPr>
+          <p:cNvPr id="3" name="Content Placeholder 2">
+            <a:extLst>
+              <a:ext uri="{FF2B5EF4-FFF2-40B4-BE49-F238E27FC236}">
+                <a16:creationId xmlns:a16="http://schemas.microsoft.com/office/drawing/2014/main" id="{E3F2F306-5716-C434-966A-5459EE2A7665}"/>
+              </a:ext>
+            </a:extLst>
+          </p:cNvPr>
+          <p:cNvSpPr>
+            <a:spLocks noGrp="1"/>
+          </p:cNvSpPr>
+          <p:nvPr>
+            <p:ph idx="1"/>
+          </p:nvPr>
+        </p:nvSpPr>
+        <p:spPr/>
+        <p:txBody>
+          <a:bodyPr/>
+          <a:lstStyle/>
+          <a:p>
+            <a:r>
+              <a:rPr lang="en-US" dirty="0"/>
+              <a:t>New Service (injection)</a:t>
+            </a:r>
+          </a:p>
+          <a:p>
+            <a:r>
+              <a:rPr lang="en-US" dirty="0"/>
+              <a:t>Send Email upon registration</a:t>
+            </a:r>
+          </a:p>
+          <a:p>
+            <a:pPr marL="0" marR="0" algn="l" rtl="0">
+              <a:lnSpc>
+                <a:spcPct val="107000"/>
+              </a:lnSpc>
+              <a:spcBef>
+                <a:spcPts val="1800"/>
+              </a:spcBef>
+              <a:spcAft>
+                <a:spcPts val="600"/>
+              </a:spcAft>
+            </a:pPr>
+            <a:r>
+              <a:rPr lang="en-US" dirty="0"/>
+              <a:t>Configure your </a:t>
+            </a:r>
+            <a:r>
+              <a:rPr lang="en-US" dirty="0" err="1"/>
+              <a:t>gmail</a:t>
+            </a:r>
+            <a:endParaRPr lang="en-US" dirty="0"/>
+          </a:p>
+          <a:p>
+            <a:pPr marL="457200" lvl="1">
+              <a:spcBef>
+                <a:spcPts val="0"/>
+              </a:spcBef>
+            </a:pPr>
+            <a:r>
+              <a:rPr lang="en-US" sz="1800" dirty="0">
+                <a:solidFill>
+                  <a:srgbClr val="000000"/>
+                </a:solidFill>
+                <a:effectLst/>
+                <a:latin typeface="Arial" panose="020B0604020202020204" pitchFamily="34" charset="0"/>
+                <a:ea typeface="Times New Roman" panose="02020603050405020304" pitchFamily="18" charset="0"/>
+              </a:rPr>
+              <a:t>Visit </a:t>
+            </a:r>
+            <a:r>
+              <a:rPr lang="en-US" sz="1800" u="sng" dirty="0">
+                <a:solidFill>
+                  <a:srgbClr val="1155CC"/>
+                </a:solidFill>
+                <a:effectLst/>
+                <a:latin typeface="Arial" panose="020B0604020202020204" pitchFamily="34" charset="0"/>
+                <a:ea typeface="Times New Roman" panose="02020603050405020304" pitchFamily="18" charset="0"/>
+                <a:hlinkClick r:id="rId2"/>
+              </a:rPr>
+              <a:t>https://myaccount.google.com/security</a:t>
+            </a:r>
+            <a:endParaRPr lang="en-US" sz="1800" u="sng" dirty="0">
+              <a:solidFill>
+                <a:srgbClr val="1155CC"/>
+              </a:solidFill>
+              <a:effectLst/>
+              <a:latin typeface="Arial" panose="020B0604020202020204" pitchFamily="34" charset="0"/>
+              <a:ea typeface="Calibri" panose="020F0502020204030204" pitchFamily="34" charset="0"/>
+              <a:cs typeface="Arial" panose="020B0604020202020204" pitchFamily="34" charset="0"/>
+              <a:hlinkClick r:id="rId3"/>
+            </a:endParaRPr>
+          </a:p>
+          <a:p>
+            <a:r>
+              <a:rPr lang="en-US" dirty="0"/>
+              <a:t>How to:</a:t>
+            </a:r>
+            <a:endParaRPr lang="en-US" dirty="0">
+              <a:hlinkClick r:id="rId3">
+                <a:extLst>
+                  <a:ext uri="{A12FA001-AC4F-418D-AE19-62706E023703}">
+                    <ahyp:hlinkClr xmlns:ahyp="http://schemas.microsoft.com/office/drawing/2018/hyperlinkcolor" val="tx"/>
+                  </a:ext>
+                </a:extLst>
+              </a:hlinkClick>
+            </a:endParaRPr>
+          </a:p>
+          <a:p>
+            <a:pPr lvl="1"/>
+            <a:r>
+              <a:rPr lang="en-US" sz="1800" u="sng" dirty="0">
+                <a:solidFill>
+                  <a:srgbClr val="1155CC"/>
+                </a:solidFill>
+                <a:effectLst/>
+                <a:latin typeface="Arial" panose="020B0604020202020204" pitchFamily="34" charset="0"/>
+                <a:ea typeface="Calibri" panose="020F0502020204030204" pitchFamily="34" charset="0"/>
+                <a:cs typeface="Arial" panose="020B0604020202020204" pitchFamily="34" charset="0"/>
+                <a:hlinkClick r:id="rId3"/>
+              </a:rPr>
+              <a:t>https://youtu.be/Ms_FDe2VzFU</a:t>
+            </a:r>
+            <a:endParaRPr lang="en-US" sz="3200" dirty="0"/>
+          </a:p>
+        </p:txBody>
+      </p:sp>
+    </p:spTree>
+    <p:extLst>
+      <p:ext uri="{BB962C8B-B14F-4D97-AF65-F5344CB8AC3E}">
+        <p14:creationId xmlns:p14="http://schemas.microsoft.com/office/powerpoint/2010/main" val="3368970181"/>
+      </p:ext>
+    </p:extLst>
+  </p:cSld>
+  <p:clrMapOvr>
+    <a:masterClrMapping/>
+  </p:clrMapOvr>
+</p:sld>
+</file>
+
+<file path=ppt/slides/slide14.xml><?xml version="1.0" encoding="utf-8"?>
+<p:sld xmlns:a="http://schemas.openxmlformats.org/drawingml/2006/main" xmlns:r="http://schemas.openxmlformats.org/officeDocument/2006/relationships" xmlns:p="http://schemas.openxmlformats.org/presentationml/2006/main">
+  <p:cSld>
+    <p:spTree>
+      <p:nvGrpSpPr>
+        <p:cNvPr id="1" name=""/>
+        <p:cNvGrpSpPr/>
+        <p:nvPr/>
+      </p:nvGrpSpPr>
+      <p:grpSpPr>
+        <a:xfrm>
+          <a:off x="0" y="0"/>
+          <a:ext cx="0" cy="0"/>
+          <a:chOff x="0" y="0"/>
+          <a:chExt cx="0" cy="0"/>
+        </a:xfrm>
+      </p:grpSpPr>
+      <p:sp>
+        <p:nvSpPr>
+          <p:cNvPr id="2" name="Title 1">
+            <a:extLst>
+              <a:ext uri="{FF2B5EF4-FFF2-40B4-BE49-F238E27FC236}">
+                <a16:creationId xmlns:a16="http://schemas.microsoft.com/office/drawing/2014/main" id="{3F2E6F0C-F0A3-BD3C-FB03-F3D14F75CA5E}"/>
+              </a:ext>
+            </a:extLst>
+          </p:cNvPr>
+          <p:cNvSpPr>
+            <a:spLocks noGrp="1"/>
+          </p:cNvSpPr>
+          <p:nvPr>
+            <p:ph type="title"/>
+          </p:nvPr>
+        </p:nvSpPr>
+        <p:spPr>
+          <a:xfrm>
+            <a:off x="838200" y="374269"/>
+            <a:ext cx="10515600" cy="1325563"/>
+          </a:xfrm>
+        </p:spPr>
+        <p:txBody>
+          <a:bodyPr/>
+          <a:lstStyle/>
+          <a:p>
+            <a:r>
+              <a:rPr lang="en-US" dirty="0"/>
+              <a:t>08 - New House</a:t>
+            </a:r>
+          </a:p>
+        </p:txBody>
+      </p:sp>
+      <p:sp>
+        <p:nvSpPr>
+          <p:cNvPr id="3" name="Content Placeholder 2">
+            <a:extLst>
+              <a:ext uri="{FF2B5EF4-FFF2-40B4-BE49-F238E27FC236}">
+                <a16:creationId xmlns:a16="http://schemas.microsoft.com/office/drawing/2014/main" id="{B7CA84FB-8055-0477-78B4-840160591BA7}"/>
+              </a:ext>
+            </a:extLst>
+          </p:cNvPr>
+          <p:cNvSpPr>
+            <a:spLocks noGrp="1"/>
+          </p:cNvSpPr>
+          <p:nvPr>
+            <p:ph idx="1"/>
+          </p:nvPr>
+        </p:nvSpPr>
+        <p:spPr/>
+        <p:txBody>
+          <a:bodyPr/>
+          <a:lstStyle/>
+          <a:p>
+            <a:r>
+              <a:rPr lang="en-US" dirty="0"/>
+              <a:t>New house model</a:t>
+            </a:r>
+          </a:p>
+          <a:p>
+            <a:pPr lvl="1"/>
+            <a:r>
+              <a:rPr lang="en-US" dirty="0"/>
+              <a:t>House Details</a:t>
+            </a:r>
+          </a:p>
+          <a:p>
+            <a:pPr lvl="1"/>
+            <a:r>
+              <a:rPr lang="en-US" dirty="0"/>
+              <a:t>Address Details</a:t>
+            </a:r>
+          </a:p>
+          <a:p>
+            <a:r>
+              <a:rPr lang="en-US" dirty="0"/>
+              <a:t>Update DB</a:t>
+            </a:r>
+          </a:p>
+          <a:p>
+            <a:r>
+              <a:rPr lang="en-US" dirty="0"/>
+              <a:t>New House form</a:t>
+            </a:r>
+          </a:p>
+          <a:p>
+            <a:pPr lvl="1"/>
+            <a:r>
+              <a:rPr lang="en-US" dirty="0"/>
+              <a:t>Image (base 64 code)</a:t>
+            </a:r>
+          </a:p>
+          <a:p>
+            <a:pPr lvl="1"/>
+            <a:r>
+              <a:rPr lang="en-US" dirty="0"/>
+              <a:t>Update address to </a:t>
+            </a:r>
+            <a:r>
+              <a:rPr lang="en-US" dirty="0" err="1"/>
+              <a:t>Longt</a:t>
+            </a:r>
+            <a:r>
+              <a:rPr lang="en-US" dirty="0"/>
+              <a:t> &amp; Lat</a:t>
+            </a:r>
+          </a:p>
+          <a:p>
+            <a:pPr lvl="2"/>
+            <a:r>
+              <a:rPr lang="en-US" dirty="0"/>
+              <a:t>Calling external API thru </a:t>
+            </a:r>
+            <a:r>
+              <a:rPr lang="en-US" dirty="0" err="1"/>
+              <a:t>HttpClient</a:t>
+            </a:r>
+            <a:endParaRPr lang="en-US" dirty="0"/>
+          </a:p>
+          <a:p>
+            <a:pPr marL="0" indent="0">
+              <a:buNone/>
+            </a:pPr>
+            <a:endParaRPr lang="en-US" dirty="0"/>
+          </a:p>
+        </p:txBody>
+      </p:sp>
+    </p:spTree>
+    <p:extLst>
+      <p:ext uri="{BB962C8B-B14F-4D97-AF65-F5344CB8AC3E}">
+        <p14:creationId xmlns:p14="http://schemas.microsoft.com/office/powerpoint/2010/main" val="3475840263"/>
+      </p:ext>
+    </p:extLst>
+  </p:cSld>
+  <p:clrMapOvr>
+    <a:masterClrMapping/>
+  </p:clrMapOvr>
+</p:sld>
+</file>
+
+<file path=ppt/slides/slide15.xml><?xml version="1.0" encoding="utf-8"?>
+<p:sld xmlns:a="http://schemas.openxmlformats.org/drawingml/2006/main" xmlns:r="http://schemas.openxmlformats.org/officeDocument/2006/relationships" xmlns:p="http://schemas.openxmlformats.org/presentationml/2006/main">
+  <p:cSld>
+    <p:spTree>
+      <p:nvGrpSpPr>
+        <p:cNvPr id="1" name=""/>
+        <p:cNvGrpSpPr/>
+        <p:nvPr/>
+      </p:nvGrpSpPr>
+      <p:grpSpPr>
+        <a:xfrm>
+          <a:off x="0" y="0"/>
+          <a:ext cx="0" cy="0"/>
+          <a:chOff x="0" y="0"/>
+          <a:chExt cx="0" cy="0"/>
+        </a:xfrm>
+      </p:grpSpPr>
+      <p:sp>
+        <p:nvSpPr>
+          <p:cNvPr id="2" name="Title 1">
+            <a:extLst>
+              <a:ext uri="{FF2B5EF4-FFF2-40B4-BE49-F238E27FC236}">
+                <a16:creationId xmlns:a16="http://schemas.microsoft.com/office/drawing/2014/main" id="{448229FC-E8E3-88F0-1954-C42F75003360}"/>
+              </a:ext>
+            </a:extLst>
+          </p:cNvPr>
+          <p:cNvSpPr>
+            <a:spLocks noGrp="1"/>
+          </p:cNvSpPr>
+          <p:nvPr>
+            <p:ph type="title"/>
+          </p:nvPr>
+        </p:nvSpPr>
+        <p:spPr/>
+        <p:txBody>
+          <a:bodyPr/>
+          <a:lstStyle/>
+          <a:p>
+            <a:r>
+              <a:rPr lang="en-US" dirty="0"/>
+              <a:t>07- Images, General UI, Client Libraries</a:t>
+            </a:r>
+          </a:p>
+        </p:txBody>
+      </p:sp>
+      <p:sp>
+        <p:nvSpPr>
+          <p:cNvPr id="3" name="Content Placeholder 2">
+            <a:extLst>
+              <a:ext uri="{FF2B5EF4-FFF2-40B4-BE49-F238E27FC236}">
+                <a16:creationId xmlns:a16="http://schemas.microsoft.com/office/drawing/2014/main" id="{63AAC317-06DF-2544-F4DD-7544408958AA}"/>
+              </a:ext>
+            </a:extLst>
+          </p:cNvPr>
+          <p:cNvSpPr>
+            <a:spLocks noGrp="1"/>
+          </p:cNvSpPr>
+          <p:nvPr>
+            <p:ph idx="1"/>
+          </p:nvPr>
+        </p:nvSpPr>
+        <p:spPr/>
+        <p:txBody>
+          <a:bodyPr/>
+          <a:lstStyle/>
+          <a:p>
+            <a:r>
+              <a:rPr lang="en-US" dirty="0"/>
+              <a:t>User Image:</a:t>
+            </a:r>
+          </a:p>
+          <a:p>
+            <a:pPr lvl="1"/>
+            <a:r>
+              <a:rPr lang="en-US" dirty="0"/>
+              <a:t>Add image (base 64 code) in </a:t>
+            </a:r>
+            <a:r>
+              <a:rPr lang="en-US" dirty="0" err="1"/>
+              <a:t>AppUser</a:t>
+            </a:r>
+            <a:r>
+              <a:rPr lang="en-US" dirty="0"/>
+              <a:t> in DB </a:t>
+            </a:r>
+          </a:p>
+          <a:p>
+            <a:pPr lvl="1"/>
+            <a:r>
+              <a:rPr lang="en-US" dirty="0"/>
+              <a:t>Register – add user image</a:t>
+            </a:r>
+          </a:p>
+          <a:p>
+            <a:pPr lvl="1"/>
+            <a:r>
+              <a:rPr lang="en-US" dirty="0"/>
+              <a:t>Post Login, display image in home page</a:t>
+            </a:r>
+          </a:p>
+          <a:p>
+            <a:r>
+              <a:rPr lang="en-US" dirty="0" err="1"/>
+              <a:t>css</a:t>
+            </a:r>
+            <a:r>
+              <a:rPr lang="en-US" dirty="0"/>
+              <a:t>: global </a:t>
+            </a:r>
+            <a:r>
+              <a:rPr lang="en-US" dirty="0" err="1"/>
+              <a:t>css</a:t>
+            </a:r>
+            <a:r>
+              <a:rPr lang="en-US" dirty="0"/>
+              <a:t> vs. page </a:t>
+            </a:r>
+            <a:r>
+              <a:rPr lang="en-US" dirty="0" err="1"/>
+              <a:t>css</a:t>
+            </a:r>
+            <a:endParaRPr lang="en-US" dirty="0"/>
+          </a:p>
+          <a:p>
+            <a:r>
+              <a:rPr lang="en-US" dirty="0"/>
+              <a:t>Client-Side Library</a:t>
+            </a:r>
+          </a:p>
+          <a:p>
+            <a:r>
+              <a:rPr lang="en-US" dirty="0" err="1"/>
+              <a:t>wwwroot</a:t>
+            </a:r>
+            <a:endParaRPr lang="en-US" dirty="0"/>
+          </a:p>
+        </p:txBody>
+      </p:sp>
+    </p:spTree>
+    <p:extLst>
+      <p:ext uri="{BB962C8B-B14F-4D97-AF65-F5344CB8AC3E}">
+        <p14:creationId xmlns:p14="http://schemas.microsoft.com/office/powerpoint/2010/main" val="328092242"/>
+      </p:ext>
+    </p:extLst>
+  </p:cSld>
+  <p:clrMapOvr>
+    <a:masterClrMapping/>
+  </p:clrMapOvr>
+</p:sld>
+</file>
+
+<file path=ppt/slides/slide16.xml><?xml version="1.0" encoding="utf-8"?>
+<p:sld xmlns:a="http://schemas.openxmlformats.org/drawingml/2006/main" xmlns:r="http://schemas.openxmlformats.org/officeDocument/2006/relationships" xmlns:p="http://schemas.openxmlformats.org/presentationml/2006/main">
+  <p:cSld>
+    <p:spTree>
+      <p:nvGrpSpPr>
+        <p:cNvPr id="1" name=""/>
+        <p:cNvGrpSpPr/>
+        <p:nvPr/>
+      </p:nvGrpSpPr>
+      <p:grpSpPr>
+        <a:xfrm>
+          <a:off x="0" y="0"/>
+          <a:ext cx="0" cy="0"/>
+          <a:chOff x="0" y="0"/>
+          <a:chExt cx="0" cy="0"/>
+        </a:xfrm>
+      </p:grpSpPr>
+      <p:sp>
+        <p:nvSpPr>
+          <p:cNvPr id="2" name="Title 1">
+            <a:extLst>
+              <a:ext uri="{FF2B5EF4-FFF2-40B4-BE49-F238E27FC236}">
+                <a16:creationId xmlns:a16="http://schemas.microsoft.com/office/drawing/2014/main" id="{55836F24-D201-95CA-4A74-17841938060E}"/>
+              </a:ext>
+            </a:extLst>
+          </p:cNvPr>
+          <p:cNvSpPr>
+            <a:spLocks noGrp="1"/>
+          </p:cNvSpPr>
+          <p:nvPr>
+            <p:ph type="title"/>
+          </p:nvPr>
+        </p:nvSpPr>
+        <p:spPr/>
+        <p:txBody>
+          <a:bodyPr/>
+          <a:lstStyle/>
+          <a:p>
+            <a:r>
+              <a:rPr lang="en-US" dirty="0"/>
+              <a:t>11-House in Maps</a:t>
+            </a:r>
+            <a:br>
+              <a:rPr lang="en-US" dirty="0"/>
+            </a:br>
+            <a:r>
+              <a:rPr lang="en-US" dirty="0"/>
+              <a:t>Leaflet</a:t>
+            </a:r>
+          </a:p>
+        </p:txBody>
+      </p:sp>
+      <p:sp>
+        <p:nvSpPr>
+          <p:cNvPr id="3" name="Content Placeholder 2">
+            <a:extLst>
+              <a:ext uri="{FF2B5EF4-FFF2-40B4-BE49-F238E27FC236}">
+                <a16:creationId xmlns:a16="http://schemas.microsoft.com/office/drawing/2014/main" id="{B1D3547E-3283-62AB-C11E-9EB9033E26B5}"/>
+              </a:ext>
+            </a:extLst>
+          </p:cNvPr>
+          <p:cNvSpPr>
+            <a:spLocks noGrp="1"/>
+          </p:cNvSpPr>
+          <p:nvPr>
+            <p:ph idx="1"/>
+          </p:nvPr>
+        </p:nvSpPr>
+        <p:spPr/>
+        <p:txBody>
+          <a:bodyPr/>
+          <a:lstStyle/>
+          <a:p>
+            <a:r>
+              <a:rPr lang="en-US" dirty="0"/>
+              <a:t>Inject Leaflet map in the webapp</a:t>
+            </a:r>
+          </a:p>
+          <a:p>
+            <a:r>
+              <a:rPr lang="en-US" dirty="0"/>
+              <a:t>Display houses as markers in the map</a:t>
+            </a:r>
+          </a:p>
+          <a:p>
+            <a:r>
+              <a:rPr lang="en-US" dirty="0"/>
+              <a:t>Click on marker display some data</a:t>
+            </a:r>
+          </a:p>
+        </p:txBody>
+      </p:sp>
+    </p:spTree>
+    <p:extLst>
+      <p:ext uri="{BB962C8B-B14F-4D97-AF65-F5344CB8AC3E}">
+        <p14:creationId xmlns:p14="http://schemas.microsoft.com/office/powerpoint/2010/main" val="1785885419"/>
+      </p:ext>
+    </p:extLst>
+  </p:cSld>
+  <p:clrMapOvr>
+    <a:masterClrMapping/>
+  </p:clrMapOvr>
+</p:sld>
+</file>
+
+<file path=ppt/slides/slide17.xml><?xml version="1.0" encoding="utf-8"?>
+<p:sld xmlns:a="http://schemas.openxmlformats.org/drawingml/2006/main" xmlns:r="http://schemas.openxmlformats.org/officeDocument/2006/relationships" xmlns:p="http://schemas.openxmlformats.org/presentationml/2006/main">
+  <p:cSld>
+    <p:spTree>
+      <p:nvGrpSpPr>
+        <p:cNvPr id="1" name=""/>
+        <p:cNvGrpSpPr/>
+        <p:nvPr/>
+      </p:nvGrpSpPr>
+      <p:grpSpPr>
+        <a:xfrm>
+          <a:off x="0" y="0"/>
+          <a:ext cx="0" cy="0"/>
+          <a:chOff x="0" y="0"/>
+          <a:chExt cx="0" cy="0"/>
+        </a:xfrm>
+      </p:grpSpPr>
+      <p:sp>
+        <p:nvSpPr>
+          <p:cNvPr id="2" name="Title 1">
+            <a:extLst>
+              <a:ext uri="{FF2B5EF4-FFF2-40B4-BE49-F238E27FC236}">
+                <a16:creationId xmlns:a16="http://schemas.microsoft.com/office/drawing/2014/main" id="{ACA375F0-A6F3-933A-8E28-C1A9557A6F8D}"/>
+              </a:ext>
+            </a:extLst>
+          </p:cNvPr>
+          <p:cNvSpPr>
+            <a:spLocks noGrp="1"/>
+          </p:cNvSpPr>
+          <p:nvPr>
+            <p:ph type="title"/>
+          </p:nvPr>
+        </p:nvSpPr>
+        <p:spPr/>
+        <p:txBody>
+          <a:bodyPr/>
+          <a:lstStyle/>
+          <a:p>
+            <a:r>
+              <a:rPr lang="en-US" dirty="0"/>
+              <a:t>09-Admin</a:t>
+            </a:r>
+          </a:p>
+        </p:txBody>
+      </p:sp>
+      <p:sp>
+        <p:nvSpPr>
+          <p:cNvPr id="3" name="Content Placeholder 2">
+            <a:extLst>
+              <a:ext uri="{FF2B5EF4-FFF2-40B4-BE49-F238E27FC236}">
+                <a16:creationId xmlns:a16="http://schemas.microsoft.com/office/drawing/2014/main" id="{87F47D88-796D-7D02-C1C6-5D9AA8DA4927}"/>
+              </a:ext>
+            </a:extLst>
+          </p:cNvPr>
+          <p:cNvSpPr>
+            <a:spLocks noGrp="1"/>
+          </p:cNvSpPr>
+          <p:nvPr>
+            <p:ph idx="1"/>
+          </p:nvPr>
+        </p:nvSpPr>
+        <p:spPr/>
+        <p:txBody>
+          <a:bodyPr/>
+          <a:lstStyle/>
+          <a:p>
+            <a:r>
+              <a:rPr lang="en-US" dirty="0"/>
+              <a:t>Admin role</a:t>
+            </a:r>
+          </a:p>
+          <a:p>
+            <a:r>
+              <a:rPr lang="en-US" dirty="0"/>
+              <a:t>List all users</a:t>
+            </a:r>
+          </a:p>
+          <a:p>
+            <a:r>
+              <a:rPr lang="en-US" dirty="0"/>
+              <a:t>Edit user</a:t>
+            </a:r>
+          </a:p>
+          <a:p>
+            <a:r>
+              <a:rPr lang="en-US" dirty="0"/>
+              <a:t>Remove user?</a:t>
+            </a:r>
+          </a:p>
+        </p:txBody>
+      </p:sp>
+    </p:spTree>
+    <p:extLst>
+      <p:ext uri="{BB962C8B-B14F-4D97-AF65-F5344CB8AC3E}">
+        <p14:creationId xmlns:p14="http://schemas.microsoft.com/office/powerpoint/2010/main" val="3663514068"/>
+      </p:ext>
+    </p:extLst>
+  </p:cSld>
+  <p:clrMapOvr>
+    <a:masterClrMapping/>
+  </p:clrMapOvr>
+</p:sld>
+</file>
+
 <file path=ppt/slides/slide2.xml><?xml version="1.0" encoding="utf-8"?>
 <p:sld xmlns:a="http://schemas.openxmlformats.org/drawingml/2006/main" xmlns:r="http://schemas.openxmlformats.org/officeDocument/2006/relationships" xmlns:p="http://schemas.openxmlformats.org/presentationml/2006/main">
   <p:cSld>

</xml_diff>

<commit_message>
New house & image & base64
</commit_message>
<xml_diff>
--- a/Housing.pptx
+++ b/Housing.pptx
@@ -18,10 +18,11 @@
     <p:sldId id="267" r:id="rId12"/>
     <p:sldId id="268" r:id="rId13"/>
     <p:sldId id="274" r:id="rId14"/>
-    <p:sldId id="272" r:id="rId15"/>
-    <p:sldId id="269" r:id="rId16"/>
+    <p:sldId id="275" r:id="rId15"/>
+    <p:sldId id="272" r:id="rId16"/>
     <p:sldId id="273" r:id="rId17"/>
-    <p:sldId id="271" r:id="rId18"/>
+    <p:sldId id="269" r:id="rId18"/>
+    <p:sldId id="271" r:id="rId19"/>
   </p:sldIdLst>
   <p:sldSz cx="12192000" cy="6858000"/>
   <p:notesSz cx="6858000" cy="9144000"/>
@@ -138,13 +139,14 @@
             <p14:sldId id="267"/>
             <p14:sldId id="268"/>
             <p14:sldId id="274"/>
+            <p14:sldId id="275"/>
             <p14:sldId id="272"/>
           </p14:sldIdLst>
         </p14:section>
         <p14:section name="TBD" id="{BDA90ABB-E26E-4479-864C-B3B2A7D967DE}">
           <p14:sldIdLst>
+            <p14:sldId id="273"/>
             <p14:sldId id="269"/>
-            <p14:sldId id="273"/>
             <p14:sldId id="271"/>
           </p14:sldIdLst>
         </p14:section>
@@ -9489,7 +9491,7 @@
           <a:p>
             <a:fld id="{405382DF-895D-41CF-B178-91ECF3162CFA}" type="datetimeFigureOut">
               <a:rPr lang="en-US" smtClean="0"/>
-              <a:t>2/29/2024</a:t>
+              <a:t>3/1/2024</a:t>
             </a:fld>
             <a:endParaRPr lang="en-US"/>
           </a:p>
@@ -9687,7 +9689,7 @@
           <a:p>
             <a:fld id="{405382DF-895D-41CF-B178-91ECF3162CFA}" type="datetimeFigureOut">
               <a:rPr lang="en-US" smtClean="0"/>
-              <a:t>2/29/2024</a:t>
+              <a:t>3/1/2024</a:t>
             </a:fld>
             <a:endParaRPr lang="en-US"/>
           </a:p>
@@ -9895,7 +9897,7 @@
           <a:p>
             <a:fld id="{405382DF-895D-41CF-B178-91ECF3162CFA}" type="datetimeFigureOut">
               <a:rPr lang="en-US" smtClean="0"/>
-              <a:t>2/29/2024</a:t>
+              <a:t>3/1/2024</a:t>
             </a:fld>
             <a:endParaRPr lang="en-US"/>
           </a:p>
@@ -10093,7 +10095,7 @@
           <a:p>
             <a:fld id="{405382DF-895D-41CF-B178-91ECF3162CFA}" type="datetimeFigureOut">
               <a:rPr lang="en-US" smtClean="0"/>
-              <a:t>2/29/2024</a:t>
+              <a:t>3/1/2024</a:t>
             </a:fld>
             <a:endParaRPr lang="en-US"/>
           </a:p>
@@ -10368,7 +10370,7 @@
           <a:p>
             <a:fld id="{405382DF-895D-41CF-B178-91ECF3162CFA}" type="datetimeFigureOut">
               <a:rPr lang="en-US" smtClean="0"/>
-              <a:t>2/29/2024</a:t>
+              <a:t>3/1/2024</a:t>
             </a:fld>
             <a:endParaRPr lang="en-US"/>
           </a:p>
@@ -10633,7 +10635,7 @@
           <a:p>
             <a:fld id="{405382DF-895D-41CF-B178-91ECF3162CFA}" type="datetimeFigureOut">
               <a:rPr lang="en-US" smtClean="0"/>
-              <a:t>2/29/2024</a:t>
+              <a:t>3/1/2024</a:t>
             </a:fld>
             <a:endParaRPr lang="en-US"/>
           </a:p>
@@ -11045,7 +11047,7 @@
           <a:p>
             <a:fld id="{405382DF-895D-41CF-B178-91ECF3162CFA}" type="datetimeFigureOut">
               <a:rPr lang="en-US" smtClean="0"/>
-              <a:t>2/29/2024</a:t>
+              <a:t>3/1/2024</a:t>
             </a:fld>
             <a:endParaRPr lang="en-US"/>
           </a:p>
@@ -11186,7 +11188,7 @@
           <a:p>
             <a:fld id="{405382DF-895D-41CF-B178-91ECF3162CFA}" type="datetimeFigureOut">
               <a:rPr lang="en-US" smtClean="0"/>
-              <a:t>2/29/2024</a:t>
+              <a:t>3/1/2024</a:t>
             </a:fld>
             <a:endParaRPr lang="en-US"/>
           </a:p>
@@ -11299,7 +11301,7 @@
           <a:p>
             <a:fld id="{405382DF-895D-41CF-B178-91ECF3162CFA}" type="datetimeFigureOut">
               <a:rPr lang="en-US" smtClean="0"/>
-              <a:t>2/29/2024</a:t>
+              <a:t>3/1/2024</a:t>
             </a:fld>
             <a:endParaRPr lang="en-US"/>
           </a:p>
@@ -11610,7 +11612,7 @@
           <a:p>
             <a:fld id="{405382DF-895D-41CF-B178-91ECF3162CFA}" type="datetimeFigureOut">
               <a:rPr lang="en-US" smtClean="0"/>
-              <a:t>2/29/2024</a:t>
+              <a:t>3/1/2024</a:t>
             </a:fld>
             <a:endParaRPr lang="en-US"/>
           </a:p>
@@ -11898,7 +11900,7 @@
           <a:p>
             <a:fld id="{405382DF-895D-41CF-B178-91ECF3162CFA}" type="datetimeFigureOut">
               <a:rPr lang="en-US" smtClean="0"/>
-              <a:t>2/29/2024</a:t>
+              <a:t>3/1/2024</a:t>
             </a:fld>
             <a:endParaRPr lang="en-US"/>
           </a:p>
@@ -12139,7 +12141,7 @@
           <a:p>
             <a:fld id="{405382DF-895D-41CF-B178-91ECF3162CFA}" type="datetimeFigureOut">
               <a:rPr lang="en-US" smtClean="0"/>
-              <a:t>2/29/2024</a:t>
+              <a:t>3/1/2024</a:t>
             </a:fld>
             <a:endParaRPr lang="en-US"/>
           </a:p>
@@ -16461,7 +16463,7 @@
           <a:p>
             <a:r>
               <a:rPr lang="en-US" dirty="0"/>
-              <a:t>08 - New House</a:t>
+              <a:t>08 - New House &amp; Image</a:t>
             </a:r>
           </a:p>
         </p:txBody>
@@ -16500,13 +16502,6 @@
             </a:r>
           </a:p>
           <a:p>
-            <a:pPr lvl="1"/>
-            <a:r>
-              <a:rPr lang="en-US" dirty="0"/>
-              <a:t>Address Details</a:t>
-            </a:r>
-          </a:p>
-          <a:p>
             <a:r>
               <a:rPr lang="en-US" dirty="0"/>
               <a:t>Update DB</a:t>
@@ -16526,7 +16521,151 @@
             </a:r>
           </a:p>
           <a:p>
+            <a:pPr marL="0" indent="0">
+              <a:buNone/>
+            </a:pPr>
+            <a:endParaRPr lang="en-US" dirty="0"/>
+          </a:p>
+        </p:txBody>
+      </p:sp>
+    </p:spTree>
+    <p:extLst>
+      <p:ext uri="{BB962C8B-B14F-4D97-AF65-F5344CB8AC3E}">
+        <p14:creationId xmlns:p14="http://schemas.microsoft.com/office/powerpoint/2010/main" val="546719328"/>
+      </p:ext>
+    </p:extLst>
+  </p:cSld>
+  <p:clrMapOvr>
+    <a:masterClrMapping/>
+  </p:clrMapOvr>
+</p:sld>
+</file>
+
+<file path=ppt/slides/slide15.xml><?xml version="1.0" encoding="utf-8"?>
+<p:sld xmlns:a="http://schemas.openxmlformats.org/drawingml/2006/main" xmlns:r="http://schemas.openxmlformats.org/officeDocument/2006/relationships" xmlns:p="http://schemas.openxmlformats.org/presentationml/2006/main">
+  <p:cSld>
+    <p:spTree>
+      <p:nvGrpSpPr>
+        <p:cNvPr id="1" name=""/>
+        <p:cNvGrpSpPr/>
+        <p:nvPr/>
+      </p:nvGrpSpPr>
+      <p:grpSpPr>
+        <a:xfrm>
+          <a:off x="0" y="0"/>
+          <a:ext cx="0" cy="0"/>
+          <a:chOff x="0" y="0"/>
+          <a:chExt cx="0" cy="0"/>
+        </a:xfrm>
+      </p:grpSpPr>
+      <p:sp>
+        <p:nvSpPr>
+          <p:cNvPr id="2" name="Title 1">
+            <a:extLst>
+              <a:ext uri="{FF2B5EF4-FFF2-40B4-BE49-F238E27FC236}">
+                <a16:creationId xmlns:a16="http://schemas.microsoft.com/office/drawing/2014/main" id="{3F2E6F0C-F0A3-BD3C-FB03-F3D14F75CA5E}"/>
+              </a:ext>
+            </a:extLst>
+          </p:cNvPr>
+          <p:cNvSpPr>
+            <a:spLocks noGrp="1"/>
+          </p:cNvSpPr>
+          <p:nvPr>
+            <p:ph type="title"/>
+          </p:nvPr>
+        </p:nvSpPr>
+        <p:spPr>
+          <a:xfrm>
+            <a:off x="838200" y="374269"/>
+            <a:ext cx="10515600" cy="1325563"/>
+          </a:xfrm>
+        </p:spPr>
+        <p:txBody>
+          <a:bodyPr/>
+          <a:lstStyle/>
+          <a:p>
+            <a:r>
+              <a:rPr lang="en-US" dirty="0"/>
+              <a:t>09 – Address &amp; HTPP API </a:t>
+            </a:r>
+          </a:p>
+        </p:txBody>
+      </p:sp>
+      <p:sp>
+        <p:nvSpPr>
+          <p:cNvPr id="3" name="Content Placeholder 2">
+            <a:extLst>
+              <a:ext uri="{FF2B5EF4-FFF2-40B4-BE49-F238E27FC236}">
+                <a16:creationId xmlns:a16="http://schemas.microsoft.com/office/drawing/2014/main" id="{B7CA84FB-8055-0477-78B4-840160591BA7}"/>
+              </a:ext>
+            </a:extLst>
+          </p:cNvPr>
+          <p:cNvSpPr>
+            <a:spLocks noGrp="1"/>
+          </p:cNvSpPr>
+          <p:nvPr>
+            <p:ph idx="1"/>
+          </p:nvPr>
+        </p:nvSpPr>
+        <p:spPr/>
+        <p:txBody>
+          <a:bodyPr>
+            <a:normAutofit/>
+          </a:bodyPr>
+          <a:lstStyle/>
+          <a:p>
+            <a:r>
+              <a:rPr lang="en-US" dirty="0"/>
+              <a:t>New Address class model</a:t>
+            </a:r>
+          </a:p>
+          <a:p>
+            <a:r>
+              <a:rPr lang="en-US" dirty="0"/>
+              <a:t>Update house model</a:t>
+            </a:r>
+          </a:p>
+          <a:p>
             <a:pPr lvl="1"/>
+            <a:r>
+              <a:rPr lang="en-US" dirty="0"/>
+              <a:t>Address Details</a:t>
+            </a:r>
+          </a:p>
+          <a:p>
+            <a:r>
+              <a:rPr lang="en-US" dirty="0"/>
+              <a:t>Update </a:t>
+            </a:r>
+            <a:r>
+              <a:rPr lang="en-US" dirty="0" err="1"/>
+              <a:t>AppUser</a:t>
+            </a:r>
+            <a:r>
+              <a:rPr lang="en-US" dirty="0"/>
+              <a:t> model</a:t>
+            </a:r>
+          </a:p>
+          <a:p>
+            <a:pPr lvl="1"/>
+            <a:r>
+              <a:rPr lang="en-US" dirty="0"/>
+              <a:t>Address Details</a:t>
+            </a:r>
+          </a:p>
+          <a:p>
+            <a:r>
+              <a:rPr lang="en-US" dirty="0"/>
+              <a:t>Update DB</a:t>
+            </a:r>
+          </a:p>
+          <a:p>
+            <a:r>
+              <a:rPr lang="en-US" dirty="0"/>
+              <a:t>Update New House and Register forms</a:t>
+            </a:r>
+          </a:p>
+          <a:p>
             <a:r>
               <a:rPr lang="en-US" dirty="0"/>
               <a:t>Update address to </a:t>
@@ -16541,7 +16680,7 @@
             </a:r>
           </a:p>
           <a:p>
-            <a:pPr lvl="2"/>
+            <a:pPr lvl="1"/>
             <a:r>
               <a:rPr lang="en-US" dirty="0"/>
               <a:t>Calling external API thru </a:t>
@@ -16573,7 +16712,112 @@
 </p:sld>
 </file>
 
-<file path=ppt/slides/slide15.xml><?xml version="1.0" encoding="utf-8"?>
+<file path=ppt/slides/slide16.xml><?xml version="1.0" encoding="utf-8"?>
+<p:sld xmlns:a="http://schemas.openxmlformats.org/drawingml/2006/main" xmlns:r="http://schemas.openxmlformats.org/officeDocument/2006/relationships" xmlns:p="http://schemas.openxmlformats.org/presentationml/2006/main">
+  <p:cSld>
+    <p:spTree>
+      <p:nvGrpSpPr>
+        <p:cNvPr id="1" name=""/>
+        <p:cNvGrpSpPr/>
+        <p:nvPr/>
+      </p:nvGrpSpPr>
+      <p:grpSpPr>
+        <a:xfrm>
+          <a:off x="0" y="0"/>
+          <a:ext cx="0" cy="0"/>
+          <a:chOff x="0" y="0"/>
+          <a:chExt cx="0" cy="0"/>
+        </a:xfrm>
+      </p:grpSpPr>
+      <p:sp>
+        <p:nvSpPr>
+          <p:cNvPr id="2" name="Title 1">
+            <a:extLst>
+              <a:ext uri="{FF2B5EF4-FFF2-40B4-BE49-F238E27FC236}">
+                <a16:creationId xmlns:a16="http://schemas.microsoft.com/office/drawing/2014/main" id="{55836F24-D201-95CA-4A74-17841938060E}"/>
+              </a:ext>
+            </a:extLst>
+          </p:cNvPr>
+          <p:cNvSpPr>
+            <a:spLocks noGrp="1"/>
+          </p:cNvSpPr>
+          <p:nvPr>
+            <p:ph type="title"/>
+          </p:nvPr>
+        </p:nvSpPr>
+        <p:spPr/>
+        <p:txBody>
+          <a:bodyPr/>
+          <a:lstStyle/>
+          <a:p>
+            <a:r>
+              <a:rPr lang="en-US" dirty="0"/>
+              <a:t>11-House in Maps</a:t>
+            </a:r>
+            <a:br>
+              <a:rPr lang="en-US" dirty="0"/>
+            </a:br>
+            <a:r>
+              <a:rPr lang="en-US" dirty="0"/>
+              <a:t>Leaflet</a:t>
+            </a:r>
+          </a:p>
+        </p:txBody>
+      </p:sp>
+      <p:sp>
+        <p:nvSpPr>
+          <p:cNvPr id="3" name="Content Placeholder 2">
+            <a:extLst>
+              <a:ext uri="{FF2B5EF4-FFF2-40B4-BE49-F238E27FC236}">
+                <a16:creationId xmlns:a16="http://schemas.microsoft.com/office/drawing/2014/main" id="{B1D3547E-3283-62AB-C11E-9EB9033E26B5}"/>
+              </a:ext>
+            </a:extLst>
+          </p:cNvPr>
+          <p:cNvSpPr>
+            <a:spLocks noGrp="1"/>
+          </p:cNvSpPr>
+          <p:nvPr>
+            <p:ph idx="1"/>
+          </p:nvPr>
+        </p:nvSpPr>
+        <p:spPr/>
+        <p:txBody>
+          <a:bodyPr/>
+          <a:lstStyle/>
+          <a:p>
+            <a:r>
+              <a:rPr lang="en-US" dirty="0"/>
+              <a:t>Inject Leaflet map in the webapp</a:t>
+            </a:r>
+          </a:p>
+          <a:p>
+            <a:r>
+              <a:rPr lang="en-US" dirty="0"/>
+              <a:t>Display houses as markers in the map</a:t>
+            </a:r>
+          </a:p>
+          <a:p>
+            <a:r>
+              <a:rPr lang="en-US" dirty="0"/>
+              <a:t>Click on marker display some data</a:t>
+            </a:r>
+          </a:p>
+        </p:txBody>
+      </p:sp>
+    </p:spTree>
+    <p:extLst>
+      <p:ext uri="{BB962C8B-B14F-4D97-AF65-F5344CB8AC3E}">
+        <p14:creationId xmlns:p14="http://schemas.microsoft.com/office/powerpoint/2010/main" val="1785885419"/>
+      </p:ext>
+    </p:extLst>
+  </p:cSld>
+  <p:clrMapOvr>
+    <a:masterClrMapping/>
+  </p:clrMapOvr>
+</p:sld>
+</file>
+
+<file path=ppt/slides/slide17.xml><?xml version="1.0" encoding="utf-8"?>
 <p:sld xmlns:a="http://schemas.openxmlformats.org/drawingml/2006/main" xmlns:r="http://schemas.openxmlformats.org/officeDocument/2006/relationships" xmlns:p="http://schemas.openxmlformats.org/presentationml/2006/main">
   <p:cSld>
     <p:spTree>
@@ -16724,112 +16968,7 @@
 </p:sld>
 </file>
 
-<file path=ppt/slides/slide16.xml><?xml version="1.0" encoding="utf-8"?>
-<p:sld xmlns:a="http://schemas.openxmlformats.org/drawingml/2006/main" xmlns:r="http://schemas.openxmlformats.org/officeDocument/2006/relationships" xmlns:p="http://schemas.openxmlformats.org/presentationml/2006/main">
-  <p:cSld>
-    <p:spTree>
-      <p:nvGrpSpPr>
-        <p:cNvPr id="1" name=""/>
-        <p:cNvGrpSpPr/>
-        <p:nvPr/>
-      </p:nvGrpSpPr>
-      <p:grpSpPr>
-        <a:xfrm>
-          <a:off x="0" y="0"/>
-          <a:ext cx="0" cy="0"/>
-          <a:chOff x="0" y="0"/>
-          <a:chExt cx="0" cy="0"/>
-        </a:xfrm>
-      </p:grpSpPr>
-      <p:sp>
-        <p:nvSpPr>
-          <p:cNvPr id="2" name="Title 1">
-            <a:extLst>
-              <a:ext uri="{FF2B5EF4-FFF2-40B4-BE49-F238E27FC236}">
-                <a16:creationId xmlns:a16="http://schemas.microsoft.com/office/drawing/2014/main" id="{55836F24-D201-95CA-4A74-17841938060E}"/>
-              </a:ext>
-            </a:extLst>
-          </p:cNvPr>
-          <p:cNvSpPr>
-            <a:spLocks noGrp="1"/>
-          </p:cNvSpPr>
-          <p:nvPr>
-            <p:ph type="title"/>
-          </p:nvPr>
-        </p:nvSpPr>
-        <p:spPr/>
-        <p:txBody>
-          <a:bodyPr/>
-          <a:lstStyle/>
-          <a:p>
-            <a:r>
-              <a:rPr lang="en-US" dirty="0"/>
-              <a:t>11-House in Maps</a:t>
-            </a:r>
-            <a:br>
-              <a:rPr lang="en-US" dirty="0"/>
-            </a:br>
-            <a:r>
-              <a:rPr lang="en-US" dirty="0"/>
-              <a:t>Leaflet</a:t>
-            </a:r>
-          </a:p>
-        </p:txBody>
-      </p:sp>
-      <p:sp>
-        <p:nvSpPr>
-          <p:cNvPr id="3" name="Content Placeholder 2">
-            <a:extLst>
-              <a:ext uri="{FF2B5EF4-FFF2-40B4-BE49-F238E27FC236}">
-                <a16:creationId xmlns:a16="http://schemas.microsoft.com/office/drawing/2014/main" id="{B1D3547E-3283-62AB-C11E-9EB9033E26B5}"/>
-              </a:ext>
-            </a:extLst>
-          </p:cNvPr>
-          <p:cNvSpPr>
-            <a:spLocks noGrp="1"/>
-          </p:cNvSpPr>
-          <p:nvPr>
-            <p:ph idx="1"/>
-          </p:nvPr>
-        </p:nvSpPr>
-        <p:spPr/>
-        <p:txBody>
-          <a:bodyPr/>
-          <a:lstStyle/>
-          <a:p>
-            <a:r>
-              <a:rPr lang="en-US" dirty="0"/>
-              <a:t>Inject Leaflet map in the webapp</a:t>
-            </a:r>
-          </a:p>
-          <a:p>
-            <a:r>
-              <a:rPr lang="en-US" dirty="0"/>
-              <a:t>Display houses as markers in the map</a:t>
-            </a:r>
-          </a:p>
-          <a:p>
-            <a:r>
-              <a:rPr lang="en-US" dirty="0"/>
-              <a:t>Click on marker display some data</a:t>
-            </a:r>
-          </a:p>
-        </p:txBody>
-      </p:sp>
-    </p:spTree>
-    <p:extLst>
-      <p:ext uri="{BB962C8B-B14F-4D97-AF65-F5344CB8AC3E}">
-        <p14:creationId xmlns:p14="http://schemas.microsoft.com/office/powerpoint/2010/main" val="1785885419"/>
-      </p:ext>
-    </p:extLst>
-  </p:cSld>
-  <p:clrMapOvr>
-    <a:masterClrMapping/>
-  </p:clrMapOvr>
-</p:sld>
-</file>
-
-<file path=ppt/slides/slide17.xml><?xml version="1.0" encoding="utf-8"?>
+<file path=ppt/slides/slide18.xml><?xml version="1.0" encoding="utf-8"?>
 <p:sld xmlns:a="http://schemas.openxmlformats.org/drawingml/2006/main" xmlns:r="http://schemas.openxmlformats.org/officeDocument/2006/relationships" xmlns:p="http://schemas.openxmlformats.org/presentationml/2006/main">
   <p:cSld>
     <p:spTree>

</xml_diff>

<commit_message>
Leaftlet map + markers
</commit_message>
<xml_diff>
--- a/Housing.pptx
+++ b/Housing.pptx
@@ -21,8 +21,9 @@
     <p:sldId id="275" r:id="rId15"/>
     <p:sldId id="272" r:id="rId16"/>
     <p:sldId id="273" r:id="rId17"/>
-    <p:sldId id="269" r:id="rId18"/>
-    <p:sldId id="271" r:id="rId19"/>
+    <p:sldId id="277" r:id="rId18"/>
+    <p:sldId id="276" r:id="rId19"/>
+    <p:sldId id="271" r:id="rId20"/>
   </p:sldIdLst>
   <p:sldSz cx="12192000" cy="6858000"/>
   <p:notesSz cx="6858000" cy="9144000"/>
@@ -141,12 +142,13 @@
             <p14:sldId id="274"/>
             <p14:sldId id="275"/>
             <p14:sldId id="272"/>
+            <p14:sldId id="273"/>
+            <p14:sldId id="277"/>
           </p14:sldIdLst>
         </p14:section>
         <p14:section name="TBD" id="{BDA90ABB-E26E-4479-864C-B3B2A7D967DE}">
           <p14:sldIdLst>
-            <p14:sldId id="273"/>
-            <p14:sldId id="269"/>
+            <p14:sldId id="276"/>
             <p14:sldId id="271"/>
           </p14:sldIdLst>
         </p14:section>
@@ -9491,7 +9493,7 @@
           <a:p>
             <a:fld id="{405382DF-895D-41CF-B178-91ECF3162CFA}" type="datetimeFigureOut">
               <a:rPr lang="en-US" smtClean="0"/>
-              <a:t>3/1/2024</a:t>
+              <a:t>3/10/2024</a:t>
             </a:fld>
             <a:endParaRPr lang="en-US"/>
           </a:p>
@@ -9689,7 +9691,7 @@
           <a:p>
             <a:fld id="{405382DF-895D-41CF-B178-91ECF3162CFA}" type="datetimeFigureOut">
               <a:rPr lang="en-US" smtClean="0"/>
-              <a:t>3/1/2024</a:t>
+              <a:t>3/10/2024</a:t>
             </a:fld>
             <a:endParaRPr lang="en-US"/>
           </a:p>
@@ -9897,7 +9899,7 @@
           <a:p>
             <a:fld id="{405382DF-895D-41CF-B178-91ECF3162CFA}" type="datetimeFigureOut">
               <a:rPr lang="en-US" smtClean="0"/>
-              <a:t>3/1/2024</a:t>
+              <a:t>3/10/2024</a:t>
             </a:fld>
             <a:endParaRPr lang="en-US"/>
           </a:p>
@@ -10095,7 +10097,7 @@
           <a:p>
             <a:fld id="{405382DF-895D-41CF-B178-91ECF3162CFA}" type="datetimeFigureOut">
               <a:rPr lang="en-US" smtClean="0"/>
-              <a:t>3/1/2024</a:t>
+              <a:t>3/10/2024</a:t>
             </a:fld>
             <a:endParaRPr lang="en-US"/>
           </a:p>
@@ -10370,7 +10372,7 @@
           <a:p>
             <a:fld id="{405382DF-895D-41CF-B178-91ECF3162CFA}" type="datetimeFigureOut">
               <a:rPr lang="en-US" smtClean="0"/>
-              <a:t>3/1/2024</a:t>
+              <a:t>3/10/2024</a:t>
             </a:fld>
             <a:endParaRPr lang="en-US"/>
           </a:p>
@@ -10635,7 +10637,7 @@
           <a:p>
             <a:fld id="{405382DF-895D-41CF-B178-91ECF3162CFA}" type="datetimeFigureOut">
               <a:rPr lang="en-US" smtClean="0"/>
-              <a:t>3/1/2024</a:t>
+              <a:t>3/10/2024</a:t>
             </a:fld>
             <a:endParaRPr lang="en-US"/>
           </a:p>
@@ -11047,7 +11049,7 @@
           <a:p>
             <a:fld id="{405382DF-895D-41CF-B178-91ECF3162CFA}" type="datetimeFigureOut">
               <a:rPr lang="en-US" smtClean="0"/>
-              <a:t>3/1/2024</a:t>
+              <a:t>3/10/2024</a:t>
             </a:fld>
             <a:endParaRPr lang="en-US"/>
           </a:p>
@@ -11188,7 +11190,7 @@
           <a:p>
             <a:fld id="{405382DF-895D-41CF-B178-91ECF3162CFA}" type="datetimeFigureOut">
               <a:rPr lang="en-US" smtClean="0"/>
-              <a:t>3/1/2024</a:t>
+              <a:t>3/10/2024</a:t>
             </a:fld>
             <a:endParaRPr lang="en-US"/>
           </a:p>
@@ -11301,7 +11303,7 @@
           <a:p>
             <a:fld id="{405382DF-895D-41CF-B178-91ECF3162CFA}" type="datetimeFigureOut">
               <a:rPr lang="en-US" smtClean="0"/>
-              <a:t>3/1/2024</a:t>
+              <a:t>3/10/2024</a:t>
             </a:fld>
             <a:endParaRPr lang="en-US"/>
           </a:p>
@@ -11612,7 +11614,7 @@
           <a:p>
             <a:fld id="{405382DF-895D-41CF-B178-91ECF3162CFA}" type="datetimeFigureOut">
               <a:rPr lang="en-US" smtClean="0"/>
-              <a:t>3/1/2024</a:t>
+              <a:t>3/10/2024</a:t>
             </a:fld>
             <a:endParaRPr lang="en-US"/>
           </a:p>
@@ -11900,7 +11902,7 @@
           <a:p>
             <a:fld id="{405382DF-895D-41CF-B178-91ECF3162CFA}" type="datetimeFigureOut">
               <a:rPr lang="en-US" smtClean="0"/>
-              <a:t>3/1/2024</a:t>
+              <a:t>3/10/2024</a:t>
             </a:fld>
             <a:endParaRPr lang="en-US"/>
           </a:p>
@@ -12141,7 +12143,7 @@
           <a:p>
             <a:fld id="{405382DF-895D-41CF-B178-91ECF3162CFA}" type="datetimeFigureOut">
               <a:rPr lang="en-US" smtClean="0"/>
-              <a:t>3/1/2024</a:t>
+              <a:t>3/10/2024</a:t>
             </a:fld>
             <a:endParaRPr lang="en-US"/>
           </a:p>
@@ -16752,7 +16754,7 @@
           <a:p>
             <a:r>
               <a:rPr lang="en-US" dirty="0"/>
-              <a:t>11-House in Maps</a:t>
+              <a:t>10-House in Maps</a:t>
             </a:r>
             <a:br>
               <a:rPr lang="en-US" dirty="0"/>
@@ -16791,15 +16793,30 @@
             </a:r>
           </a:p>
           <a:p>
+            <a:pPr lvl="1"/>
             <a:r>
               <a:rPr lang="en-US" dirty="0"/>
-              <a:t>Display houses as markers in the map</a:t>
+              <a:t>Client-side library</a:t>
             </a:r>
           </a:p>
           <a:p>
             <a:r>
               <a:rPr lang="en-US" dirty="0"/>
-              <a:t>Click on marker display some data</a:t>
+              <a:t>Create map JS in Razor Page</a:t>
+            </a:r>
+          </a:p>
+          <a:p>
+            <a:pPr lvl="1"/>
+            <a:r>
+              <a:rPr lang="en-US" dirty="0"/>
+              <a:t>Default center</a:t>
+            </a:r>
+          </a:p>
+          <a:p>
+            <a:pPr lvl="1"/>
+            <a:r>
+              <a:rPr lang="en-US" dirty="0"/>
+              <a:t>Center based on logged in user address</a:t>
             </a:r>
           </a:p>
         </p:txBody>
@@ -16839,7 +16856,7 @@
           <p:cNvPr id="2" name="Title 1">
             <a:extLst>
               <a:ext uri="{FF2B5EF4-FFF2-40B4-BE49-F238E27FC236}">
-                <a16:creationId xmlns:a16="http://schemas.microsoft.com/office/drawing/2014/main" id="{448229FC-E8E3-88F0-1954-C42F75003360}"/>
+                <a16:creationId xmlns:a16="http://schemas.microsoft.com/office/drawing/2014/main" id="{55836F24-D201-95CA-4A74-17841938060E}"/>
               </a:ext>
             </a:extLst>
           </p:cNvPr>
@@ -16857,7 +16874,14 @@
           <a:p>
             <a:r>
               <a:rPr lang="en-US" dirty="0"/>
-              <a:t>07- Images, General UI, Client Libraries</a:t>
+              <a:t>11-House in Maps</a:t>
+            </a:r>
+            <a:br>
+              <a:rPr lang="en-US" dirty="0"/>
+            </a:br>
+            <a:r>
+              <a:rPr lang="en-US" dirty="0"/>
+              <a:t>Leaflet</a:t>
             </a:r>
           </a:p>
         </p:txBody>
@@ -16867,7 +16891,145 @@
           <p:cNvPr id="3" name="Content Placeholder 2">
             <a:extLst>
               <a:ext uri="{FF2B5EF4-FFF2-40B4-BE49-F238E27FC236}">
-                <a16:creationId xmlns:a16="http://schemas.microsoft.com/office/drawing/2014/main" id="{63AAC317-06DF-2544-F4DD-7544408958AA}"/>
+                <a16:creationId xmlns:a16="http://schemas.microsoft.com/office/drawing/2014/main" id="{B1D3547E-3283-62AB-C11E-9EB9033E26B5}"/>
+              </a:ext>
+            </a:extLst>
+          </p:cNvPr>
+          <p:cNvSpPr>
+            <a:spLocks noGrp="1"/>
+          </p:cNvSpPr>
+          <p:nvPr>
+            <p:ph idx="1"/>
+          </p:nvPr>
+        </p:nvSpPr>
+        <p:spPr/>
+        <p:txBody>
+          <a:bodyPr>
+            <a:normAutofit lnSpcReduction="10000"/>
+          </a:bodyPr>
+          <a:lstStyle/>
+          <a:p>
+            <a:r>
+              <a:rPr lang="en-US" dirty="0"/>
+              <a:t>House as Marker</a:t>
+            </a:r>
+          </a:p>
+          <a:p>
+            <a:r>
+              <a:rPr lang="en-US" dirty="0"/>
+              <a:t>House details as Marker Pop-up</a:t>
+            </a:r>
+          </a:p>
+          <a:p>
+            <a:r>
+              <a:rPr lang="en-US" dirty="0"/>
+              <a:t>Click navigates to House details</a:t>
+            </a:r>
+          </a:p>
+          <a:p>
+            <a:endParaRPr lang="en-US" dirty="0"/>
+          </a:p>
+          <a:p>
+            <a:r>
+              <a:rPr lang="en-US" dirty="0"/>
+              <a:t>Calling .NET from JS</a:t>
+            </a:r>
+          </a:p>
+          <a:p>
+            <a:pPr lvl="1"/>
+            <a:r>
+              <a:rPr lang="en-US" dirty="0">
+                <a:hlinkClick r:id="rId2"/>
+              </a:rPr>
+              <a:t>https://learn.microsoft.com/en-us/aspnet/core/blazor/javascript-interoperability/call-dotnet-from-javascript?view=aspnetcore-7.0</a:t>
+            </a:r>
+            <a:endParaRPr lang="en-US" dirty="0"/>
+          </a:p>
+          <a:p>
+            <a:r>
+              <a:rPr lang="en-US" dirty="0"/>
+              <a:t>Calling JS from .NET</a:t>
+            </a:r>
+          </a:p>
+          <a:p>
+            <a:pPr lvl="1"/>
+            <a:r>
+              <a:rPr lang="en-US" dirty="0">
+                <a:hlinkClick r:id="rId3"/>
+              </a:rPr>
+              <a:t>https://learn.microsoft.com/en-us/aspnet/core/blazor/javascript-interoperability/call-javascript-from-dotnet?view=aspnetcore-7.0</a:t>
+            </a:r>
+            <a:r>
+              <a:rPr lang="en-US" dirty="0"/>
+              <a:t> </a:t>
+            </a:r>
+          </a:p>
+        </p:txBody>
+      </p:sp>
+    </p:spTree>
+    <p:extLst>
+      <p:ext uri="{BB962C8B-B14F-4D97-AF65-F5344CB8AC3E}">
+        <p14:creationId xmlns:p14="http://schemas.microsoft.com/office/powerpoint/2010/main" val="272868272"/>
+      </p:ext>
+    </p:extLst>
+  </p:cSld>
+  <p:clrMapOvr>
+    <a:masterClrMapping/>
+  </p:clrMapOvr>
+</p:sld>
+</file>
+
+<file path=ppt/slides/slide18.xml><?xml version="1.0" encoding="utf-8"?>
+<p:sld xmlns:a="http://schemas.openxmlformats.org/drawingml/2006/main" xmlns:r="http://schemas.openxmlformats.org/officeDocument/2006/relationships" xmlns:p="http://schemas.openxmlformats.org/presentationml/2006/main">
+  <p:cSld>
+    <p:spTree>
+      <p:nvGrpSpPr>
+        <p:cNvPr id="1" name=""/>
+        <p:cNvGrpSpPr/>
+        <p:nvPr/>
+      </p:nvGrpSpPr>
+      <p:grpSpPr>
+        <a:xfrm>
+          <a:off x="0" y="0"/>
+          <a:ext cx="0" cy="0"/>
+          <a:chOff x="0" y="0"/>
+          <a:chExt cx="0" cy="0"/>
+        </a:xfrm>
+      </p:grpSpPr>
+      <p:sp>
+        <p:nvSpPr>
+          <p:cNvPr id="2" name="Title 1">
+            <a:extLst>
+              <a:ext uri="{FF2B5EF4-FFF2-40B4-BE49-F238E27FC236}">
+                <a16:creationId xmlns:a16="http://schemas.microsoft.com/office/drawing/2014/main" id="{0B01AF06-9260-6C96-6EBB-8B5C67A9599F}"/>
+              </a:ext>
+            </a:extLst>
+          </p:cNvPr>
+          <p:cNvSpPr>
+            <a:spLocks noGrp="1"/>
+          </p:cNvSpPr>
+          <p:nvPr>
+            <p:ph type="title"/>
+          </p:nvPr>
+        </p:nvSpPr>
+        <p:spPr/>
+        <p:txBody>
+          <a:bodyPr/>
+          <a:lstStyle/>
+          <a:p>
+            <a:r>
+              <a:rPr lang="en-US" dirty="0"/>
+              <a:t>11- Initiate Map based on my Loc</a:t>
+            </a:r>
+          </a:p>
+        </p:txBody>
+      </p:sp>
+      <p:sp>
+        <p:nvSpPr>
+          <p:cNvPr id="3" name="Content Placeholder 2">
+            <a:extLst>
+              <a:ext uri="{FF2B5EF4-FFF2-40B4-BE49-F238E27FC236}">
+                <a16:creationId xmlns:a16="http://schemas.microsoft.com/office/drawing/2014/main" id="{2C59702C-B6E7-44AE-7026-8C96FF298BD4}"/>
               </a:ext>
             </a:extLst>
           </p:cNvPr>
@@ -16885,80 +17047,27 @@
           <a:p>
             <a:r>
               <a:rPr lang="en-US" dirty="0"/>
-              <a:t>User Image:</a:t>
-            </a:r>
-          </a:p>
-          <a:p>
-            <a:pPr lvl="1"/>
-            <a:r>
-              <a:rPr lang="en-US" dirty="0"/>
-              <a:t>Add image (base 64 code) in </a:t>
-            </a:r>
-            <a:r>
-              <a:rPr lang="en-US" dirty="0" err="1"/>
-              <a:t>AppUser</a:t>
-            </a:r>
-            <a:r>
-              <a:rPr lang="en-US" dirty="0"/>
-              <a:t> in DB </a:t>
-            </a:r>
-          </a:p>
-          <a:p>
-            <a:pPr lvl="1"/>
-            <a:r>
-              <a:rPr lang="en-US" dirty="0"/>
-              <a:t>Register – add user image</a:t>
-            </a:r>
-          </a:p>
-          <a:p>
-            <a:pPr lvl="1"/>
-            <a:r>
-              <a:rPr lang="en-US" dirty="0"/>
-              <a:t>Post Login, display image in home page</a:t>
+              <a:t>Based on my current location</a:t>
             </a:r>
           </a:p>
           <a:p>
             <a:r>
-              <a:rPr lang="en-US" dirty="0" err="1"/>
-              <a:t>css</a:t>
+              <a:rPr lang="en-US" dirty="0"/>
+              <a:t>Based on user’s address</a:t>
             </a:r>
-            <a:r>
-              <a:rPr lang="en-US" dirty="0"/>
-              <a:t>: global </a:t>
-            </a:r>
-            <a:r>
-              <a:rPr lang="en-US" dirty="0" err="1"/>
-              <a:t>css</a:t>
-            </a:r>
-            <a:r>
-              <a:rPr lang="en-US" dirty="0"/>
-              <a:t> vs. page </a:t>
-            </a:r>
-            <a:r>
-              <a:rPr lang="en-US" dirty="0" err="1"/>
-              <a:t>css</a:t>
-            </a:r>
-            <a:endParaRPr lang="en-US" dirty="0"/>
           </a:p>
           <a:p>
             <a:r>
               <a:rPr lang="en-US" dirty="0"/>
-              <a:t>Client-Side Library</a:t>
+              <a:t>Search?</a:t>
             </a:r>
-          </a:p>
-          <a:p>
-            <a:r>
-              <a:rPr lang="en-US" dirty="0" err="1"/>
-              <a:t>wwwroot</a:t>
-            </a:r>
-            <a:endParaRPr lang="en-US" dirty="0"/>
           </a:p>
         </p:txBody>
       </p:sp>
     </p:spTree>
     <p:extLst>
       <p:ext uri="{BB962C8B-B14F-4D97-AF65-F5344CB8AC3E}">
-        <p14:creationId xmlns:p14="http://schemas.microsoft.com/office/powerpoint/2010/main" val="328092242"/>
+        <p14:creationId xmlns:p14="http://schemas.microsoft.com/office/powerpoint/2010/main" val="2298254303"/>
       </p:ext>
     </p:extLst>
   </p:cSld>
@@ -16968,7 +17077,7 @@
 </p:sld>
 </file>
 
-<file path=ppt/slides/slide18.xml><?xml version="1.0" encoding="utf-8"?>
+<file path=ppt/slides/slide19.xml><?xml version="1.0" encoding="utf-8"?>
 <p:sld xmlns:a="http://schemas.openxmlformats.org/drawingml/2006/main" xmlns:r="http://schemas.openxmlformats.org/officeDocument/2006/relationships" xmlns:p="http://schemas.openxmlformats.org/presentationml/2006/main">
   <p:cSld>
     <p:spTree>

</xml_diff>